<commit_message>
Updating various files 11-14-2018
</commit_message>
<xml_diff>
--- a/Data Workload Assessment Model and Tool/Workload Assessment Tools/Data Workload Assessment Model and Tool - Overview and Guidance - v3 - Embedded Tool.pptx
+++ b/Data Workload Assessment Model and Tool/Workload Assessment Tools/Data Workload Assessment Model and Tool - Overview and Guidance - v3 - Embedded Tool.pptx
@@ -245,7 +245,7 @@
               <a:rPr lang="en-US" smtClean="0">
                 <a:latin typeface="Segoe UI" pitchFamily="34" charset="0"/>
               </a:rPr>
-              <a:t>9/4/2018 4:43 PM</a:t>
+              <a:t>11/12/2018 4:27 PM</a:t>
             </a:fld>
             <a:endParaRPr lang="en-US" dirty="0">
               <a:latin typeface="Segoe UI" pitchFamily="34" charset="0"/>
@@ -539,7 +539,7 @@
           <a:p>
             <a:fld id="{D18B56EA-E28F-4F92-9F16-7A6F2501B303}" type="datetime8">
               <a:rPr lang="en-US" smtClean="0"/>
-              <a:t>9/4/2018 4:42 PM</a:t>
+              <a:t>11/12/2018 4:22 PM</a:t>
             </a:fld>
             <a:endParaRPr lang="en-US" dirty="0"/>
           </a:p>
@@ -868,7 +868,7 @@
           <a:p>
             <a:fld id="{56C2EDE2-D073-4F7E-A469-E134256712C5}" type="datetime8">
               <a:rPr lang="en-US" smtClean="0"/>
-              <a:t>9/4/2018 4:42 PM</a:t>
+              <a:t>11/12/2018 4:22 PM</a:t>
             </a:fld>
             <a:endParaRPr lang="en-US" dirty="0"/>
           </a:p>
@@ -1056,7 +1056,7 @@
           <a:p>
             <a:fld id="{26EED51F-96EB-4E4E-9B3B-EAE92F3CF0A4}" type="datetime8">
               <a:rPr lang="en-US" smtClean="0"/>
-              <a:t>9/4/2018 4:42 PM</a:t>
+              <a:t>11/12/2018 4:22 PM</a:t>
             </a:fld>
             <a:endParaRPr lang="en-US" dirty="0"/>
           </a:p>
@@ -1271,7 +1271,7 @@
           <a:p>
             <a:fld id="{26EED51F-96EB-4E4E-9B3B-EAE92F3CF0A4}" type="datetime8">
               <a:rPr lang="en-US" smtClean="0"/>
-              <a:t>9/4/2018 4:42 PM</a:t>
+              <a:t>11/12/2018 4:22 PM</a:t>
             </a:fld>
             <a:endParaRPr lang="en-US" dirty="0"/>
           </a:p>
@@ -1486,7 +1486,7 @@
           <a:p>
             <a:fld id="{26EED51F-96EB-4E4E-9B3B-EAE92F3CF0A4}" type="datetime8">
               <a:rPr lang="en-US" smtClean="0"/>
-              <a:t>9/4/2018 4:42 PM</a:t>
+              <a:t>11/12/2018 4:22 PM</a:t>
             </a:fld>
             <a:endParaRPr lang="en-US" dirty="0"/>
           </a:p>
@@ -1701,7 +1701,7 @@
           <a:p>
             <a:fld id="{26EED51F-96EB-4E4E-9B3B-EAE92F3CF0A4}" type="datetime8">
               <a:rPr lang="en-US" smtClean="0"/>
-              <a:t>9/4/2018 4:42 PM</a:t>
+              <a:t>11/12/2018 4:22 PM</a:t>
             </a:fld>
             <a:endParaRPr lang="en-US" dirty="0"/>
           </a:p>
@@ -1916,7 +1916,7 @@
           <a:p>
             <a:fld id="{26EED51F-96EB-4E4E-9B3B-EAE92F3CF0A4}" type="datetime8">
               <a:rPr lang="en-US" smtClean="0"/>
-              <a:t>9/4/2018 4:42 PM</a:t>
+              <a:t>11/12/2018 4:22 PM</a:t>
             </a:fld>
             <a:endParaRPr lang="en-US" dirty="0"/>
           </a:p>
@@ -2131,7 +2131,7 @@
           <a:p>
             <a:fld id="{26EED51F-96EB-4E4E-9B3B-EAE92F3CF0A4}" type="datetime8">
               <a:rPr lang="en-US" smtClean="0"/>
-              <a:t>9/4/2018 4:42 PM</a:t>
+              <a:t>11/12/2018 4:22 PM</a:t>
             </a:fld>
             <a:endParaRPr lang="en-US" dirty="0"/>
           </a:p>
@@ -10843,7 +10843,7 @@
         <p:spPr>
           <a:xfrm>
             <a:off x="273050" y="3954463"/>
-            <a:ext cx="4937760" cy="3434786"/>
+            <a:ext cx="4937760" cy="1246495"/>
           </a:xfrm>
         </p:spPr>
         <p:txBody>
@@ -10880,114 +10880,6 @@
           </a:p>
           <a:p>
             <a:pPr lvl="0"/>
-            <a:endParaRPr lang="en-US" sz="1000" dirty="0"/>
-          </a:p>
-          <a:p>
-            <a:pPr lvl="0"/>
-            <a:r>
-              <a:rPr lang="en-US" sz="1000" b="1" dirty="0"/>
-              <a:t>Jonathon Frost, Solution Architect</a:t>
-            </a:r>
-          </a:p>
-          <a:p>
-            <a:pPr lvl="0"/>
-            <a:r>
-              <a:rPr lang="en-US" sz="1000" dirty="0"/>
-              <a:t>DMJ Engineering Program</a:t>
-            </a:r>
-          </a:p>
-          <a:p>
-            <a:pPr lvl="0"/>
-            <a:r>
-              <a:rPr lang="en-US" sz="1000" dirty="0" err="1">
-                <a:hlinkClick r:id="rId3"/>
-              </a:rPr>
-              <a:t>jfrost@microsoft.com</a:t>
-            </a:r>
-            <a:endParaRPr lang="en-US" sz="1000" dirty="0"/>
-          </a:p>
-          <a:p>
-            <a:pPr lvl="0"/>
-            <a:endParaRPr lang="en-US" sz="1000" dirty="0"/>
-          </a:p>
-          <a:p>
-            <a:pPr lvl="0"/>
-            <a:r>
-              <a:rPr lang="en-US" sz="1000" b="1" dirty="0"/>
-              <a:t>Kuldeep Chauhan, Solution Architect</a:t>
-            </a:r>
-          </a:p>
-          <a:p>
-            <a:pPr lvl="0"/>
-            <a:r>
-              <a:rPr lang="en-US" sz="1000" dirty="0"/>
-              <a:t>DMJ Engineering Program</a:t>
-            </a:r>
-          </a:p>
-          <a:p>
-            <a:pPr lvl="0"/>
-            <a:r>
-              <a:rPr lang="en-US" sz="1000" dirty="0" err="1">
-                <a:hlinkClick r:id="rId3"/>
-              </a:rPr>
-              <a:t>kuldeep.chauhan@microsoft.com</a:t>
-            </a:r>
-            <a:endParaRPr lang="en-US" sz="1000" dirty="0"/>
-          </a:p>
-          <a:p>
-            <a:pPr lvl="0"/>
-            <a:endParaRPr lang="en-US" sz="1000" dirty="0"/>
-          </a:p>
-          <a:p>
-            <a:pPr lvl="0"/>
-            <a:r>
-              <a:rPr lang="en-US" sz="1000" b="1" dirty="0"/>
-              <a:t>Mitch van Huuksloot, Solution Architect</a:t>
-            </a:r>
-          </a:p>
-          <a:p>
-            <a:pPr lvl="0"/>
-            <a:r>
-              <a:rPr lang="en-US" sz="1000" dirty="0"/>
-              <a:t>DMJ Engineering Program</a:t>
-            </a:r>
-          </a:p>
-          <a:p>
-            <a:pPr lvl="0"/>
-            <a:r>
-              <a:rPr lang="en-US" sz="1000" dirty="0" err="1">
-                <a:hlinkClick r:id="rId4"/>
-              </a:rPr>
-              <a:t>mitch.van.huuksloot@microsoft.com</a:t>
-            </a:r>
-            <a:endParaRPr lang="en-US" sz="1000" dirty="0"/>
-          </a:p>
-          <a:p>
-            <a:pPr lvl="0"/>
-            <a:endParaRPr lang="en-US" sz="1000" dirty="0"/>
-          </a:p>
-          <a:p>
-            <a:pPr lvl="0"/>
-            <a:r>
-              <a:rPr lang="en-US" sz="1000" b="1" dirty="0"/>
-              <a:t>Mukesh Kumar, Program Manager</a:t>
-            </a:r>
-          </a:p>
-          <a:p>
-            <a:pPr lvl="0"/>
-            <a:r>
-              <a:rPr lang="en-US" sz="1000" dirty="0"/>
-              <a:t>DMJ Engineering Program</a:t>
-            </a:r>
-          </a:p>
-          <a:p>
-            <a:pPr lvl="0"/>
-            <a:r>
-              <a:rPr lang="en-US" sz="1000" dirty="0" err="1">
-                <a:hlinkClick r:id="rId5"/>
-              </a:rPr>
-              <a:t>mukeshku@microsoft.com</a:t>
-            </a:r>
             <a:endParaRPr lang="en-US" sz="1000" dirty="0"/>
           </a:p>
           <a:p>
@@ -19093,7 +18985,7 @@
           <a:graphicData uri="http://schemas.openxmlformats.org/presentationml/2006/ole">
             <mc:AlternateContent xmlns:mc="http://schemas.openxmlformats.org/markup-compatibility/2006">
               <mc:Choice xmlns:v="urn:schemas-microsoft-com:vml" Requires="v">
-                <p:oleObj spid="_x0000_s1029" name="Macro-Enabled Worksheet" showAsIcon="1" r:id="rId4" imgW="914400" imgH="771480" progId="Excel.SheetMacroEnabled.12">
+                <p:oleObj spid="_x0000_s1026" name="Macro-Enabled Worksheet" showAsIcon="1" r:id="rId4" imgW="914400" imgH="771480" progId="Excel.SheetMacroEnabled.12">
                   <p:embed/>
                 </p:oleObj>
               </mc:Choice>
@@ -19102,7 +18994,13 @@
                   <p:embed/>
                   <p:pic>
                     <p:nvPicPr>
-                      <p:cNvPr id="0" name=""/>
+                      <p:cNvPr id="5" name="Object 4">
+                        <a:extLst>
+                          <a:ext uri="{FF2B5EF4-FFF2-40B4-BE49-F238E27FC236}">
+                            <a16:creationId xmlns:a16="http://schemas.microsoft.com/office/drawing/2014/main" id="{58B710E0-F7E7-40DC-A924-1D2BD2D9D4E1}"/>
+                          </a:ext>
+                        </a:extLst>
+                      </p:cNvPr>
                       <p:cNvPicPr/>
                       <p:nvPr/>
                     </p:nvPicPr>
@@ -20227,18 +20125,18 @@
 </file>
 
 <file path=customXml/item2.xml><?xml version="1.0" encoding="utf-8"?>
+<p:properties xmlns:p="http://schemas.microsoft.com/office/2006/metadata/properties" xmlns:xsi="http://www.w3.org/2001/XMLSchema-instance" xmlns:pc="http://schemas.microsoft.com/office/infopath/2007/PartnerControls">
+  <documentManagement/>
+</p:properties>
+</file>
+
+<file path=customXml/item3.xml><?xml version="1.0" encoding="utf-8"?>
 <?mso-contentType ?>
 <FormTemplates xmlns="http://schemas.microsoft.com/sharepoint/v3/contenttype/forms">
   <Display>DocumentLibraryForm</Display>
   <Edit>DocumentLibraryForm</Edit>
   <New>DocumentLibraryForm</New>
 </FormTemplates>
-</file>
-
-<file path=customXml/item3.xml><?xml version="1.0" encoding="utf-8"?>
-<p:properties xmlns:p="http://schemas.microsoft.com/office/2006/metadata/properties" xmlns:xsi="http://www.w3.org/2001/XMLSchema-instance" xmlns:pc="http://schemas.microsoft.com/office/infopath/2007/PartnerControls">
-  <documentManagement/>
-</p:properties>
 </file>
 
 <file path=customXml/itemProps1.xml><?xml version="1.0" encoding="utf-8"?>
@@ -20261,26 +20159,26 @@
 </file>
 
 <file path=customXml/itemProps2.xml><?xml version="1.0" encoding="utf-8"?>
+<ds:datastoreItem xmlns:ds="http://schemas.openxmlformats.org/officeDocument/2006/customXml" ds:itemID="{F990F116-B58F-4255-B05B-DA3808E0E5C6}">
+  <ds:schemaRefs>
+    <ds:schemaRef ds:uri="http://purl.org/dc/elements/1.1/"/>
+    <ds:schemaRef ds:uri="http://schemas.microsoft.com/office/2006/metadata/properties"/>
+    <ds:schemaRef ds:uri="6e4f6676-91ee-47a5-8164-c59c33586ba7"/>
+    <ds:schemaRef ds:uri="http://purl.org/dc/terms/"/>
+    <ds:schemaRef ds:uri="4053a332-7d8e-488d-aba6-ad6dfa6b0f2d"/>
+    <ds:schemaRef ds:uri="http://schemas.microsoft.com/office/2006/documentManagement/types"/>
+    <ds:schemaRef ds:uri="http://schemas.microsoft.com/office/infopath/2007/PartnerControls"/>
+    <ds:schemaRef ds:uri="http://schemas.openxmlformats.org/package/2006/metadata/core-properties"/>
+    <ds:schemaRef ds:uri="http://www.w3.org/XML/1998/namespace"/>
+    <ds:schemaRef ds:uri="http://purl.org/dc/dcmitype/"/>
+  </ds:schemaRefs>
+</ds:datastoreItem>
+</file>
+
+<file path=customXml/itemProps3.xml><?xml version="1.0" encoding="utf-8"?>
 <ds:datastoreItem xmlns:ds="http://schemas.openxmlformats.org/officeDocument/2006/customXml" ds:itemID="{758FDAC0-319D-4A54-8D8E-1D42CB1F8004}">
   <ds:schemaRefs>
     <ds:schemaRef ds:uri="http://schemas.microsoft.com/sharepoint/v3/contenttype/forms"/>
   </ds:schemaRefs>
 </ds:datastoreItem>
-</file>
-
-<file path=customXml/itemProps3.xml><?xml version="1.0" encoding="utf-8"?>
-<ds:datastoreItem xmlns:ds="http://schemas.openxmlformats.org/officeDocument/2006/customXml" ds:itemID="{F990F116-B58F-4255-B05B-DA3808E0E5C6}">
-  <ds:schemaRefs>
-    <ds:schemaRef ds:uri="6e4f6676-91ee-47a5-8164-c59c33586ba7"/>
-    <ds:schemaRef ds:uri="4053a332-7d8e-488d-aba6-ad6dfa6b0f2d"/>
-    <ds:schemaRef ds:uri="http://purl.org/dc/terms/"/>
-    <ds:schemaRef ds:uri="http://schemas.microsoft.com/office/infopath/2007/PartnerControls"/>
-    <ds:schemaRef ds:uri="http://schemas.microsoft.com/office/2006/documentManagement/types"/>
-    <ds:schemaRef ds:uri="http://purl.org/dc/elements/1.1/"/>
-    <ds:schemaRef ds:uri="http://schemas.microsoft.com/office/2006/metadata/properties"/>
-    <ds:schemaRef ds:uri="http://schemas.openxmlformats.org/package/2006/metadata/core-properties"/>
-    <ds:schemaRef ds:uri="http://www.w3.org/XML/1998/namespace"/>
-    <ds:schemaRef ds:uri="http://purl.org/dc/dcmitype/"/>
-  </ds:schemaRefs>
-</ds:datastoreItem>
 </file>
</xml_diff>